<commit_message>
Add link to ppt
</commit_message>
<xml_diff>
--- a/기획/프레젠테이션.pptx
+++ b/기획/프레젠테이션.pptx
@@ -15,6 +15,7 @@
     <p:sldId id="263" r:id="rId9"/>
     <p:sldId id="264" r:id="rId10"/>
     <p:sldId id="265" r:id="rId11"/>
+    <p:sldId id="266" r:id="rId12"/>
   </p:sldIdLst>
   <p:sldSz cx="12192000" cy="6858000"/>
   <p:notesSz cx="6858000" cy="9144000"/>
@@ -113,6 +114,11 @@
       </a:defRPr>
     </a:lvl9pPr>
   </p:defaultTextStyle>
+  <p:extLst>
+    <p:ext uri="{EFAFB233-063F-42B5-8137-9DF3F51BA10A}">
+      <p15:sldGuideLst xmlns:p15="http://schemas.microsoft.com/office/powerpoint/2012/main"/>
+    </p:ext>
+  </p:extLst>
 </p:presentation>
 </file>
 
@@ -3445,6 +3451,110 @@
 </p:sld>
 </file>
 
+<file path=ppt/slides/slide11.xml><?xml version="1.0" encoding="utf-8"?>
+<p:sld xmlns:a="http://schemas.openxmlformats.org/drawingml/2006/main" xmlns:r="http://schemas.openxmlformats.org/officeDocument/2006/relationships" xmlns:p="http://schemas.openxmlformats.org/presentationml/2006/main">
+  <p:cSld>
+    <p:spTree>
+      <p:nvGrpSpPr>
+        <p:cNvPr id="1" name=""/>
+        <p:cNvGrpSpPr/>
+        <p:nvPr/>
+      </p:nvGrpSpPr>
+      <p:grpSpPr>
+        <a:xfrm>
+          <a:off x="0" y="0"/>
+          <a:ext cx="0" cy="0"/>
+          <a:chOff x="0" y="0"/>
+          <a:chExt cx="0" cy="0"/>
+        </a:xfrm>
+      </p:grpSpPr>
+      <p:sp>
+        <p:nvSpPr>
+          <p:cNvPr id="2" name="TextBox 1">
+            <a:extLst>
+              <a:ext uri="{FF2B5EF4-FFF2-40B4-BE49-F238E27FC236}">
+                <a16:creationId xmlns:a16="http://schemas.microsoft.com/office/drawing/2014/main" id="{77821B0F-00CC-470E-8F81-B1C61F0ACA85}"/>
+              </a:ext>
+            </a:extLst>
+          </p:cNvPr>
+          <p:cNvSpPr txBox="1"/>
+          <p:nvPr/>
+        </p:nvSpPr>
+        <p:spPr>
+          <a:xfrm>
+            <a:off x="4104142" y="2875002"/>
+            <a:ext cx="3983715" cy="1107996"/>
+          </a:xfrm>
+          <a:prstGeom prst="rect">
+            <a:avLst/>
+          </a:prstGeom>
+          <a:noFill/>
+        </p:spPr>
+        <p:txBody>
+          <a:bodyPr wrap="square" rtlCol="0">
+            <a:spAutoFit/>
+          </a:bodyPr>
+          <a:lstStyle/>
+          <a:p>
+            <a:r>
+              <a:rPr lang="en-US" altLang="ko-KR" sz="6600" dirty="0"/>
+              <a:t>Prototype</a:t>
+            </a:r>
+            <a:endParaRPr lang="ko-KR" altLang="en-US" sz="6600" dirty="0"/>
+          </a:p>
+        </p:txBody>
+      </p:sp>
+      <p:sp>
+        <p:nvSpPr>
+          <p:cNvPr id="4" name="TextBox 3">
+            <a:extLst>
+              <a:ext uri="{FF2B5EF4-FFF2-40B4-BE49-F238E27FC236}">
+                <a16:creationId xmlns:a16="http://schemas.microsoft.com/office/drawing/2014/main" id="{17933699-81D9-4E8C-9808-E044347C02DF}"/>
+              </a:ext>
+            </a:extLst>
+          </p:cNvPr>
+          <p:cNvSpPr txBox="1"/>
+          <p:nvPr/>
+        </p:nvSpPr>
+        <p:spPr>
+          <a:xfrm>
+            <a:off x="5759281" y="4125286"/>
+            <a:ext cx="673436" cy="461665"/>
+          </a:xfrm>
+          <a:prstGeom prst="rect">
+            <a:avLst/>
+          </a:prstGeom>
+          <a:noFill/>
+        </p:spPr>
+        <p:txBody>
+          <a:bodyPr wrap="square" rtlCol="0">
+            <a:spAutoFit/>
+          </a:bodyPr>
+          <a:lstStyle/>
+          <a:p>
+            <a:r>
+              <a:rPr lang="en-US" altLang="ko-KR" sz="2400" dirty="0">
+                <a:hlinkClick r:id="rId2"/>
+              </a:rPr>
+              <a:t>link</a:t>
+            </a:r>
+            <a:endParaRPr lang="ko-KR" altLang="en-US" sz="2400" dirty="0"/>
+          </a:p>
+        </p:txBody>
+      </p:sp>
+    </p:spTree>
+    <p:extLst>
+      <p:ext uri="{BB962C8B-B14F-4D97-AF65-F5344CB8AC3E}">
+        <p14:creationId xmlns:p14="http://schemas.microsoft.com/office/powerpoint/2010/main" val="118567901"/>
+      </p:ext>
+    </p:extLst>
+  </p:cSld>
+  <p:clrMapOvr>
+    <a:masterClrMapping/>
+  </p:clrMapOvr>
+</p:sld>
+</file>
+
 <file path=ppt/slides/slide2.xml><?xml version="1.0" encoding="utf-8"?>
 <p:sld xmlns:a="http://schemas.openxmlformats.org/drawingml/2006/main" xmlns:r="http://schemas.openxmlformats.org/officeDocument/2006/relationships" xmlns:p="http://schemas.openxmlformats.org/presentationml/2006/main">
   <p:cSld>

</xml_diff>